<commit_message>
avance a presentar profesor
</commit_message>
<xml_diff>
--- a/Proyecto backend alcance v2.pptx
+++ b/Proyecto backend alcance v2.pptx
@@ -276,7 +276,7 @@
           <a:p>
             <a:fld id="{FBF5F76E-CE09-4645-9427-130AC89CA13D}" type="datetimeFigureOut">
               <a:rPr lang="es-ES" smtClean="0"/>
-              <a:t>07/03/2021</a:t>
+              <a:t>16/03/2021</a:t>
             </a:fld>
             <a:endParaRPr lang="es-ES"/>
           </a:p>
@@ -474,7 +474,7 @@
           <a:p>
             <a:fld id="{FBF5F76E-CE09-4645-9427-130AC89CA13D}" type="datetimeFigureOut">
               <a:rPr lang="es-ES" smtClean="0"/>
-              <a:t>07/03/2021</a:t>
+              <a:t>16/03/2021</a:t>
             </a:fld>
             <a:endParaRPr lang="es-ES"/>
           </a:p>
@@ -682,7 +682,7 @@
           <a:p>
             <a:fld id="{FBF5F76E-CE09-4645-9427-130AC89CA13D}" type="datetimeFigureOut">
               <a:rPr lang="es-ES" smtClean="0"/>
-              <a:t>07/03/2021</a:t>
+              <a:t>16/03/2021</a:t>
             </a:fld>
             <a:endParaRPr lang="es-ES"/>
           </a:p>
@@ -880,7 +880,7 @@
           <a:p>
             <a:fld id="{FBF5F76E-CE09-4645-9427-130AC89CA13D}" type="datetimeFigureOut">
               <a:rPr lang="es-ES" smtClean="0"/>
-              <a:t>07/03/2021</a:t>
+              <a:t>16/03/2021</a:t>
             </a:fld>
             <a:endParaRPr lang="es-ES"/>
           </a:p>
@@ -1155,7 +1155,7 @@
           <a:p>
             <a:fld id="{FBF5F76E-CE09-4645-9427-130AC89CA13D}" type="datetimeFigureOut">
               <a:rPr lang="es-ES" smtClean="0"/>
-              <a:t>07/03/2021</a:t>
+              <a:t>16/03/2021</a:t>
             </a:fld>
             <a:endParaRPr lang="es-ES"/>
           </a:p>
@@ -1420,7 +1420,7 @@
           <a:p>
             <a:fld id="{FBF5F76E-CE09-4645-9427-130AC89CA13D}" type="datetimeFigureOut">
               <a:rPr lang="es-ES" smtClean="0"/>
-              <a:t>07/03/2021</a:t>
+              <a:t>16/03/2021</a:t>
             </a:fld>
             <a:endParaRPr lang="es-ES"/>
           </a:p>
@@ -1832,7 +1832,7 @@
           <a:p>
             <a:fld id="{FBF5F76E-CE09-4645-9427-130AC89CA13D}" type="datetimeFigureOut">
               <a:rPr lang="es-ES" smtClean="0"/>
-              <a:t>07/03/2021</a:t>
+              <a:t>16/03/2021</a:t>
             </a:fld>
             <a:endParaRPr lang="es-ES"/>
           </a:p>
@@ -1973,7 +1973,7 @@
           <a:p>
             <a:fld id="{FBF5F76E-CE09-4645-9427-130AC89CA13D}" type="datetimeFigureOut">
               <a:rPr lang="es-ES" smtClean="0"/>
-              <a:t>07/03/2021</a:t>
+              <a:t>16/03/2021</a:t>
             </a:fld>
             <a:endParaRPr lang="es-ES"/>
           </a:p>
@@ -2086,7 +2086,7 @@
           <a:p>
             <a:fld id="{FBF5F76E-CE09-4645-9427-130AC89CA13D}" type="datetimeFigureOut">
               <a:rPr lang="es-ES" smtClean="0"/>
-              <a:t>07/03/2021</a:t>
+              <a:t>16/03/2021</a:t>
             </a:fld>
             <a:endParaRPr lang="es-ES"/>
           </a:p>
@@ -2397,7 +2397,7 @@
           <a:p>
             <a:fld id="{FBF5F76E-CE09-4645-9427-130AC89CA13D}" type="datetimeFigureOut">
               <a:rPr lang="es-ES" smtClean="0"/>
-              <a:t>07/03/2021</a:t>
+              <a:t>16/03/2021</a:t>
             </a:fld>
             <a:endParaRPr lang="es-ES"/>
           </a:p>
@@ -2685,7 +2685,7 @@
           <a:p>
             <a:fld id="{FBF5F76E-CE09-4645-9427-130AC89CA13D}" type="datetimeFigureOut">
               <a:rPr lang="es-ES" smtClean="0"/>
-              <a:t>07/03/2021</a:t>
+              <a:t>16/03/2021</a:t>
             </a:fld>
             <a:endParaRPr lang="es-ES"/>
           </a:p>
@@ -2926,7 +2926,7 @@
           <a:p>
             <a:fld id="{FBF5F76E-CE09-4645-9427-130AC89CA13D}" type="datetimeFigureOut">
               <a:rPr lang="es-ES" smtClean="0"/>
-              <a:t>07/03/2021</a:t>
+              <a:t>16/03/2021</a:t>
             </a:fld>
             <a:endParaRPr lang="es-ES"/>
           </a:p>
@@ -8078,7 +8078,7 @@
         </p:nvSpPr>
         <p:spPr>
           <a:xfrm>
-            <a:off x="891574" y="1309898"/>
+            <a:off x="891573" y="1309898"/>
             <a:ext cx="4783085" cy="369332"/>
           </a:xfrm>
           <a:prstGeom prst="rect">

</xml_diff>